<commit_message>
[#233] Add annotation line.
</commit_message>
<xml_diff>
--- a/etc/img/SwagEdit Graphics.pptx
+++ b/etc/img/SwagEdit Graphics.pptx
@@ -3313,11 +3313,7 @@
               <a:pPr algn="ctr"/>
               <a:r>
                 <a:rPr lang="en-US" sz="1000" dirty="0" smtClean="0"/>
-                <a:t>Swagger </a:t>
-              </a:r>
-              <a:r>
-                <a:rPr lang="en-US" sz="1000" dirty="0" smtClean="0"/>
-                <a:t>Reference Properties</a:t>
+                <a:t>Swagger Reference Properties</a:t>
               </a:r>
               <a:br>
                 <a:rPr lang="en-US" sz="1000" dirty="0" smtClean="0"/>
@@ -3462,11 +3458,7 @@
             <a:pPr algn="ctr"/>
             <a:r>
               <a:rPr lang="en-US" sz="1000" dirty="0" smtClean="0"/>
-              <a:t>Cycling: Repeat </a:t>
-            </a:r>
-            <a:r>
-              <a:rPr lang="en-US" sz="1000" dirty="0" smtClean="0"/>
-              <a:t>key combination to cycle file, project &amp; workspace scope</a:t>
+              <a:t>Cycling: Repeat key combination to cycle file, project &amp; workspace scope</a:t>
             </a:r>
             <a:endParaRPr lang="en-US" sz="1000" dirty="0"/>
           </a:p>
@@ -3578,6 +3570,48 @@
           </a:p>
         </p:txBody>
       </p:sp>
+      <p:cxnSp>
+        <p:nvCxnSpPr>
+          <p:cNvPr id="3" name="Straight Connector 2"/>
+          <p:cNvCxnSpPr/>
+          <p:nvPr/>
+        </p:nvCxnSpPr>
+        <p:spPr>
+          <a:xfrm>
+            <a:off x="5486400" y="4738107"/>
+            <a:ext cx="0" cy="1586493"/>
+          </a:xfrm>
+          <a:prstGeom prst="line">
+            <a:avLst/>
+          </a:prstGeom>
+          <a:ln>
+            <a:solidFill>
+              <a:srgbClr val="7030A0"/>
+            </a:solidFill>
+          </a:ln>
+          <a:effectLst>
+            <a:outerShdw blurRad="50800" dist="38100" dir="5400000" algn="t" rotWithShape="0">
+              <a:prstClr val="black">
+                <a:alpha val="40000"/>
+              </a:prstClr>
+            </a:outerShdw>
+          </a:effectLst>
+        </p:spPr>
+        <p:style>
+          <a:lnRef idx="1">
+            <a:schemeClr val="accent1"/>
+          </a:lnRef>
+          <a:fillRef idx="0">
+            <a:schemeClr val="accent1"/>
+          </a:fillRef>
+          <a:effectRef idx="0">
+            <a:schemeClr val="accent1"/>
+          </a:effectRef>
+          <a:fontRef idx="minor">
+            <a:schemeClr val="tx1"/>
+          </a:fontRef>
+        </p:style>
+      </p:cxnSp>
     </p:spTree>
     <p:extLst>
       <p:ext uri="{BB962C8B-B14F-4D97-AF65-F5344CB8AC3E}">

</xml_diff>